<commit_message>
Added / updated the Game AI Hack slides
</commit_message>
<xml_diff>
--- a/lectures/Game AI Hack 2018.pptx
+++ b/lectures/Game AI Hack 2018.pptx
@@ -5,7 +5,7 @@
     <p:sldMasterId id="2147483660" r:id="rId1"/>
   </p:sldMasterIdLst>
   <p:notesMasterIdLst>
-    <p:notesMasterId r:id="rId17"/>
+    <p:notesMasterId r:id="rId18"/>
   </p:notesMasterIdLst>
   <p:sldIdLst>
     <p:sldId id="256" r:id="rId2"/>
@@ -23,6 +23,7 @@
     <p:sldId id="267" r:id="rId14"/>
     <p:sldId id="268" r:id="rId15"/>
     <p:sldId id="270" r:id="rId16"/>
+    <p:sldId id="271" r:id="rId17"/>
   </p:sldIdLst>
   <p:sldSz cx="12192000" cy="6858000"/>
   <p:notesSz cx="6858000" cy="9144000"/>
@@ -211,7 +212,7 @@
           <a:p>
             <a:fld id="{D71155DB-25CE-DB4D-A797-83CC6F7CCB8C}" type="datetimeFigureOut">
               <a:rPr lang="en-US" smtClean="0"/>
-              <a:t>6/6/18</a:t>
+              <a:t>6/7/18</a:t>
             </a:fld>
             <a:endParaRPr lang="en-US"/>
           </a:p>
@@ -712,7 +713,7 @@
           <a:p>
             <a:fld id="{58708828-D5C0-584F-B203-A673D0E7F672}" type="datetimeFigureOut">
               <a:rPr lang="en-US" smtClean="0"/>
-              <a:t>6/6/18</a:t>
+              <a:t>6/7/18</a:t>
             </a:fld>
             <a:endParaRPr lang="en-US"/>
           </a:p>
@@ -910,7 +911,7 @@
           <a:p>
             <a:fld id="{58708828-D5C0-584F-B203-A673D0E7F672}" type="datetimeFigureOut">
               <a:rPr lang="en-US" smtClean="0"/>
-              <a:t>6/6/18</a:t>
+              <a:t>6/7/18</a:t>
             </a:fld>
             <a:endParaRPr lang="en-US"/>
           </a:p>
@@ -1118,7 +1119,7 @@
           <a:p>
             <a:fld id="{58708828-D5C0-584F-B203-A673D0E7F672}" type="datetimeFigureOut">
               <a:rPr lang="en-US" smtClean="0"/>
-              <a:t>6/6/18</a:t>
+              <a:t>6/7/18</a:t>
             </a:fld>
             <a:endParaRPr lang="en-US"/>
           </a:p>
@@ -1316,7 +1317,7 @@
           <a:p>
             <a:fld id="{58708828-D5C0-584F-B203-A673D0E7F672}" type="datetimeFigureOut">
               <a:rPr lang="en-US" smtClean="0"/>
-              <a:t>6/6/18</a:t>
+              <a:t>6/7/18</a:t>
             </a:fld>
             <a:endParaRPr lang="en-US"/>
           </a:p>
@@ -1591,7 +1592,7 @@
           <a:p>
             <a:fld id="{58708828-D5C0-584F-B203-A673D0E7F672}" type="datetimeFigureOut">
               <a:rPr lang="en-US" smtClean="0"/>
-              <a:t>6/6/18</a:t>
+              <a:t>6/7/18</a:t>
             </a:fld>
             <a:endParaRPr lang="en-US"/>
           </a:p>
@@ -1856,7 +1857,7 @@
           <a:p>
             <a:fld id="{58708828-D5C0-584F-B203-A673D0E7F672}" type="datetimeFigureOut">
               <a:rPr lang="en-US" smtClean="0"/>
-              <a:t>6/6/18</a:t>
+              <a:t>6/7/18</a:t>
             </a:fld>
             <a:endParaRPr lang="en-US"/>
           </a:p>
@@ -2268,7 +2269,7 @@
           <a:p>
             <a:fld id="{58708828-D5C0-584F-B203-A673D0E7F672}" type="datetimeFigureOut">
               <a:rPr lang="en-US" smtClean="0"/>
-              <a:t>6/6/18</a:t>
+              <a:t>6/7/18</a:t>
             </a:fld>
             <a:endParaRPr lang="en-US"/>
           </a:p>
@@ -2409,7 +2410,7 @@
           <a:p>
             <a:fld id="{58708828-D5C0-584F-B203-A673D0E7F672}" type="datetimeFigureOut">
               <a:rPr lang="en-US" smtClean="0"/>
-              <a:t>6/6/18</a:t>
+              <a:t>6/7/18</a:t>
             </a:fld>
             <a:endParaRPr lang="en-US"/>
           </a:p>
@@ -2522,7 +2523,7 @@
           <a:p>
             <a:fld id="{58708828-D5C0-584F-B203-A673D0E7F672}" type="datetimeFigureOut">
               <a:rPr lang="en-US" smtClean="0"/>
-              <a:t>6/6/18</a:t>
+              <a:t>6/7/18</a:t>
             </a:fld>
             <a:endParaRPr lang="en-US"/>
           </a:p>
@@ -2833,7 +2834,7 @@
           <a:p>
             <a:fld id="{58708828-D5C0-584F-B203-A673D0E7F672}" type="datetimeFigureOut">
               <a:rPr lang="en-US" smtClean="0"/>
-              <a:t>6/6/18</a:t>
+              <a:t>6/7/18</a:t>
             </a:fld>
             <a:endParaRPr lang="en-US"/>
           </a:p>
@@ -3121,7 +3122,7 @@
           <a:p>
             <a:fld id="{58708828-D5C0-584F-B203-A673D0E7F672}" type="datetimeFigureOut">
               <a:rPr lang="en-US" smtClean="0"/>
-              <a:t>6/6/18</a:t>
+              <a:t>6/7/18</a:t>
             </a:fld>
             <a:endParaRPr lang="en-US"/>
           </a:p>
@@ -3362,7 +3363,7 @@
           <a:p>
             <a:fld id="{58708828-D5C0-584F-B203-A673D0E7F672}" type="datetimeFigureOut">
               <a:rPr lang="en-US" smtClean="0"/>
-              <a:t>6/6/18</a:t>
+              <a:t>6/7/18</a:t>
             </a:fld>
             <a:endParaRPr lang="en-US"/>
           </a:p>
@@ -4561,6 +4562,104 @@
     <p:extLst>
       <p:ext uri="{BB962C8B-B14F-4D97-AF65-F5344CB8AC3E}">
         <p14:creationId xmlns:p14="http://schemas.microsoft.com/office/powerpoint/2010/main" val="2125292334"/>
+      </p:ext>
+    </p:extLst>
+  </p:cSld>
+  <p:clrMapOvr>
+    <a:masterClrMapping/>
+  </p:clrMapOvr>
+</p:sld>
+</file>
+
+<file path=ppt/slides/slide16.xml><?xml version="1.0" encoding="utf-8"?>
+<p:sld xmlns:a="http://schemas.openxmlformats.org/drawingml/2006/main" xmlns:r="http://schemas.openxmlformats.org/officeDocument/2006/relationships" xmlns:p="http://schemas.openxmlformats.org/presentationml/2006/main">
+  <p:cSld>
+    <p:spTree>
+      <p:nvGrpSpPr>
+        <p:cNvPr id="1" name=""/>
+        <p:cNvGrpSpPr/>
+        <p:nvPr/>
+      </p:nvGrpSpPr>
+      <p:grpSpPr>
+        <a:xfrm>
+          <a:off x="0" y="0"/>
+          <a:ext cx="0" cy="0"/>
+          <a:chOff x="0" y="0"/>
+          <a:chExt cx="0" cy="0"/>
+        </a:xfrm>
+      </p:grpSpPr>
+      <p:sp>
+        <p:nvSpPr>
+          <p:cNvPr id="2" name="Title 1">
+            <a:extLst>
+              <a:ext uri="{FF2B5EF4-FFF2-40B4-BE49-F238E27FC236}">
+                <a16:creationId xmlns:a16="http://schemas.microsoft.com/office/drawing/2014/main" id="{D021CF6A-3BAC-194B-976E-324A1BD53F26}"/>
+              </a:ext>
+            </a:extLst>
+          </p:cNvPr>
+          <p:cNvSpPr>
+            <a:spLocks noGrp="1"/>
+          </p:cNvSpPr>
+          <p:nvPr>
+            <p:ph type="title"/>
+          </p:nvPr>
+        </p:nvSpPr>
+        <p:spPr/>
+        <p:txBody>
+          <a:bodyPr/>
+          <a:lstStyle/>
+          <a:p>
+            <a:r>
+              <a:rPr lang="en-GB" dirty="0"/>
+              <a:t>Assessment</a:t>
+            </a:r>
+            <a:endParaRPr lang="en-US" dirty="0"/>
+          </a:p>
+        </p:txBody>
+      </p:sp>
+      <p:sp>
+        <p:nvSpPr>
+          <p:cNvPr id="3" name="Content Placeholder 2">
+            <a:extLst>
+              <a:ext uri="{FF2B5EF4-FFF2-40B4-BE49-F238E27FC236}">
+                <a16:creationId xmlns:a16="http://schemas.microsoft.com/office/drawing/2014/main" id="{41A7D22C-A814-A04F-9B87-8BD888CC1AED}"/>
+              </a:ext>
+            </a:extLst>
+          </p:cNvPr>
+          <p:cNvSpPr>
+            <a:spLocks noGrp="1"/>
+          </p:cNvSpPr>
+          <p:nvPr>
+            <p:ph idx="1"/>
+          </p:nvPr>
+        </p:nvSpPr>
+        <p:spPr/>
+        <p:txBody>
+          <a:bodyPr/>
+          <a:lstStyle/>
+          <a:p>
+            <a:r>
+              <a:rPr lang="en-GB" dirty="0"/>
+              <a:t>50% of the mark for a working game variant and AI bot</a:t>
+            </a:r>
+          </a:p>
+          <a:p>
+            <a:r>
+              <a:rPr lang="en-GB" dirty="0"/>
+              <a:t>50% in proportion to the number </a:t>
+            </a:r>
+            <a:r>
+              <a:rPr lang="en-GB"/>
+              <a:t>of victories</a:t>
+            </a:r>
+            <a:endParaRPr lang="en-US"/>
+          </a:p>
+        </p:txBody>
+      </p:sp>
+    </p:spTree>
+    <p:extLst>
+      <p:ext uri="{BB962C8B-B14F-4D97-AF65-F5344CB8AC3E}">
+        <p14:creationId xmlns:p14="http://schemas.microsoft.com/office/powerpoint/2010/main" val="3796437239"/>
       </p:ext>
     </p:extLst>
   </p:cSld>

</xml_diff>